<commit_message>
done i think (docs)
</commit_message>
<xml_diff>
--- a/docs/pos_tagging_prezentare.pptx
+++ b/docs/pos_tagging_prezentare.pptx
@@ -14071,8 +14071,8 @@
           </a:prstGeom>
         </p:spPr>
       </p:pic>
-      <mc:AlternateContent xmlns:mc="http://schemas.openxmlformats.org/markup-compatibility/2006">
-        <mc:Choice xmlns:a14="http://schemas.microsoft.com/office/drawing/2010/main" Requires="a14">
+      <mc:AlternateContent xmlns:mc="http://schemas.openxmlformats.org/markup-compatibility/2006" xmlns:a14="http://schemas.microsoft.com/office/drawing/2010/main">
+        <mc:Choice Requires="a14">
           <p:sp>
             <p:nvSpPr>
               <p:cNvPr id="11" name="Google Shape;125;p17">
@@ -14698,7 +14698,7 @@
             </p:txBody>
           </p:sp>
         </mc:Choice>
-        <mc:Fallback>
+        <mc:Fallback xmlns="">
           <p:sp>
             <p:nvSpPr>
               <p:cNvPr id="11" name="Google Shape;125;p17">
@@ -15816,8 +15816,8 @@
           </a:p>
         </p:txBody>
       </p:sp>
-      <mc:AlternateContent xmlns:mc="http://schemas.openxmlformats.org/markup-compatibility/2006" xmlns:a14="http://schemas.microsoft.com/office/drawing/2010/main">
-        <mc:Choice Requires="a14">
+      <mc:AlternateContent xmlns:mc="http://schemas.openxmlformats.org/markup-compatibility/2006">
+        <mc:Choice xmlns:a14="http://schemas.microsoft.com/office/drawing/2010/main" Requires="a14">
           <p:sp>
             <p:nvSpPr>
               <p:cNvPr id="12" name="TextBox 11">
@@ -15832,7 +15832,7 @@
             </p:nvSpPr>
             <p:spPr>
               <a:xfrm>
-                <a:off x="679440" y="1712397"/>
+                <a:off x="679440" y="1666033"/>
                 <a:ext cx="4572000" cy="546816"/>
               </a:xfrm>
               <a:prstGeom prst="rect">
@@ -16154,7 +16154,7 @@
             </p:txBody>
           </p:sp>
         </mc:Choice>
-        <mc:Fallback xmlns="">
+        <mc:Fallback>
           <p:sp>
             <p:nvSpPr>
               <p:cNvPr id="12" name="TextBox 11">
@@ -16171,7 +16171,7 @@
             </p:nvSpPr>
             <p:spPr>
               <a:xfrm>
-                <a:off x="679440" y="1712397"/>
+                <a:off x="679440" y="1666033"/>
                 <a:ext cx="4572000" cy="546816"/>
               </a:xfrm>
               <a:prstGeom prst="rect">
@@ -16199,8 +16199,8 @@
           </p:sp>
         </mc:Fallback>
       </mc:AlternateContent>
-      <mc:AlternateContent xmlns:mc="http://schemas.openxmlformats.org/markup-compatibility/2006" xmlns:a14="http://schemas.microsoft.com/office/drawing/2010/main">
-        <mc:Choice Requires="a14">
+      <mc:AlternateContent xmlns:mc="http://schemas.openxmlformats.org/markup-compatibility/2006">
+        <mc:Choice xmlns:a14="http://schemas.microsoft.com/office/drawing/2010/main" Requires="a14">
           <p:sp>
             <p:nvSpPr>
               <p:cNvPr id="17" name="Google Shape;125;p17">
@@ -16217,7 +16217,7 @@
             </p:nvSpPr>
             <p:spPr>
               <a:xfrm>
-                <a:off x="4356436" y="1584729"/>
+                <a:off x="4356436" y="1538365"/>
                 <a:ext cx="4331854" cy="619800"/>
               </a:xfrm>
               <a:prstGeom prst="rect">
@@ -16978,7 +16978,7 @@
             </p:txBody>
           </p:sp>
         </mc:Choice>
-        <mc:Fallback xmlns="">
+        <mc:Fallback>
           <p:sp>
             <p:nvSpPr>
               <p:cNvPr id="17" name="Google Shape;125;p17">
@@ -16995,7 +16995,7 @@
             </p:nvSpPr>
             <p:spPr>
               <a:xfrm>
-                <a:off x="4356436" y="1584729"/>
+                <a:off x="4356436" y="1538365"/>
                 <a:ext cx="4331854" cy="619800"/>
               </a:xfrm>
               <a:prstGeom prst="rect">
@@ -17004,7 +17004,7 @@
               <a:blipFill>
                 <a:blip r:embed="rId4"/>
                 <a:stretch>
-                  <a:fillRect b="-22549"/>
+                  <a:fillRect b="-23529"/>
                 </a:stretch>
               </a:blipFill>
               <a:ln>
@@ -17042,7 +17042,7 @@
         </p:nvSpPr>
         <p:spPr>
           <a:xfrm>
-            <a:off x="679439" y="2466764"/>
+            <a:off x="679440" y="2374036"/>
             <a:ext cx="7801135" cy="619800"/>
           </a:xfrm>
           <a:prstGeom prst="rect">
@@ -17379,8 +17379,8 @@
           </a:p>
         </p:txBody>
       </p:sp>
-      <mc:AlternateContent xmlns:mc="http://schemas.openxmlformats.org/markup-compatibility/2006" xmlns:a14="http://schemas.microsoft.com/office/drawing/2010/main">
-        <mc:Choice Requires="a14">
+      <mc:AlternateContent xmlns:mc="http://schemas.openxmlformats.org/markup-compatibility/2006">
+        <mc:Choice xmlns:a14="http://schemas.microsoft.com/office/drawing/2010/main" Requires="a14">
           <p:sp>
             <p:nvSpPr>
               <p:cNvPr id="19" name="TextBox 18">
@@ -17395,7 +17395,7 @@
             </p:nvSpPr>
             <p:spPr>
               <a:xfrm>
-                <a:off x="87746" y="3240580"/>
+                <a:off x="87746" y="3211159"/>
                 <a:ext cx="5823526" cy="509050"/>
               </a:xfrm>
               <a:prstGeom prst="rect">
@@ -17576,7 +17576,7 @@
             </p:txBody>
           </p:sp>
         </mc:Choice>
-        <mc:Fallback xmlns="">
+        <mc:Fallback>
           <p:sp>
             <p:nvSpPr>
               <p:cNvPr id="19" name="TextBox 18">
@@ -17593,7 +17593,7 @@
             </p:nvSpPr>
             <p:spPr>
               <a:xfrm>
-                <a:off x="87746" y="3240580"/>
+                <a:off x="87746" y="3211159"/>
                 <a:ext cx="5823526" cy="509050"/>
               </a:xfrm>
               <a:prstGeom prst="rect">
@@ -17621,8 +17621,8 @@
           </p:sp>
         </mc:Fallback>
       </mc:AlternateContent>
-      <mc:AlternateContent xmlns:mc="http://schemas.openxmlformats.org/markup-compatibility/2006" xmlns:a14="http://schemas.microsoft.com/office/drawing/2010/main">
-        <mc:Choice Requires="a14">
+      <mc:AlternateContent xmlns:mc="http://schemas.openxmlformats.org/markup-compatibility/2006">
+        <mc:Choice xmlns:a14="http://schemas.microsoft.com/office/drawing/2010/main" Requires="a14">
           <p:sp>
             <p:nvSpPr>
               <p:cNvPr id="21" name="TextBox 20">
@@ -17637,7 +17637,7 @@
             </p:nvSpPr>
             <p:spPr>
               <a:xfrm>
-                <a:off x="18473" y="3745079"/>
+                <a:off x="18473" y="3715658"/>
                 <a:ext cx="5962072" cy="546816"/>
               </a:xfrm>
               <a:prstGeom prst="rect">
@@ -18013,7 +18013,7 @@
             </p:txBody>
           </p:sp>
         </mc:Choice>
-        <mc:Fallback xmlns="">
+        <mc:Fallback>
           <p:sp>
             <p:nvSpPr>
               <p:cNvPr id="21" name="TextBox 20">
@@ -18030,7 +18030,7 @@
             </p:nvSpPr>
             <p:spPr>
               <a:xfrm>
-                <a:off x="18473" y="3745079"/>
+                <a:off x="18473" y="3715658"/>
                 <a:ext cx="5962072" cy="546816"/>
               </a:xfrm>
               <a:prstGeom prst="rect">
@@ -18039,7 +18039,7 @@
               <a:blipFill>
                 <a:blip r:embed="rId6"/>
                 <a:stretch>
-                  <a:fillRect t="-34444" b="-68889"/>
+                  <a:fillRect t="-34831" b="-70787"/>
                 </a:stretch>
               </a:blipFill>
             </p:spPr>
@@ -18058,8 +18058,8 @@
           </p:sp>
         </mc:Fallback>
       </mc:AlternateContent>
-      <mc:AlternateContent xmlns:mc="http://schemas.openxmlformats.org/markup-compatibility/2006" xmlns:a14="http://schemas.microsoft.com/office/drawing/2010/main">
-        <mc:Choice Requires="a14">
+      <mc:AlternateContent xmlns:mc="http://schemas.openxmlformats.org/markup-compatibility/2006">
+        <mc:Choice xmlns:a14="http://schemas.microsoft.com/office/drawing/2010/main" Requires="a14">
           <p:sp>
             <p:nvSpPr>
               <p:cNvPr id="23" name="TextBox 22">
@@ -18074,7 +18074,7 @@
             </p:nvSpPr>
             <p:spPr>
               <a:xfrm>
-                <a:off x="0" y="4316234"/>
+                <a:off x="0" y="4286813"/>
                 <a:ext cx="5999018" cy="546816"/>
               </a:xfrm>
               <a:prstGeom prst="rect">
@@ -18642,7 +18642,7 @@
             </p:txBody>
           </p:sp>
         </mc:Choice>
-        <mc:Fallback xmlns="">
+        <mc:Fallback>
           <p:sp>
             <p:nvSpPr>
               <p:cNvPr id="23" name="TextBox 22">
@@ -18659,7 +18659,7 @@
             </p:nvSpPr>
             <p:spPr>
               <a:xfrm>
-                <a:off x="0" y="4316234"/>
+                <a:off x="0" y="4286813"/>
                 <a:ext cx="5999018" cy="546816"/>
               </a:xfrm>
               <a:prstGeom prst="rect">
@@ -18703,7 +18703,7 @@
         </p:nvSpPr>
         <p:spPr>
           <a:xfrm>
-            <a:off x="831840" y="3308560"/>
+            <a:off x="831840" y="3279139"/>
             <a:ext cx="837780" cy="373091"/>
           </a:xfrm>
           <a:prstGeom prst="rect">
@@ -19012,7 +19012,7 @@
         </p:nvSpPr>
         <p:spPr>
           <a:xfrm>
-            <a:off x="831840" y="3824321"/>
+            <a:off x="831840" y="3794900"/>
             <a:ext cx="837780" cy="373091"/>
           </a:xfrm>
           <a:prstGeom prst="rect">
@@ -19321,7 +19321,7 @@
         </p:nvSpPr>
         <p:spPr>
           <a:xfrm>
-            <a:off x="831840" y="4392081"/>
+            <a:off x="831840" y="4362660"/>
             <a:ext cx="837780" cy="373091"/>
           </a:xfrm>
           <a:prstGeom prst="rect">
@@ -19614,8 +19614,8 @@
           </a:p>
         </p:txBody>
       </p:sp>
-      <mc:AlternateContent xmlns:mc="http://schemas.openxmlformats.org/markup-compatibility/2006" xmlns:a14="http://schemas.microsoft.com/office/drawing/2010/main">
-        <mc:Choice Requires="a14">
+      <mc:AlternateContent xmlns:mc="http://schemas.openxmlformats.org/markup-compatibility/2006">
+        <mc:Choice xmlns:a14="http://schemas.microsoft.com/office/drawing/2010/main" Requires="a14">
           <p:sp>
             <p:nvSpPr>
               <p:cNvPr id="29" name="Google Shape;125;p17">
@@ -19632,7 +19632,7 @@
             </p:nvSpPr>
             <p:spPr>
               <a:xfrm>
-                <a:off x="4356436" y="3201676"/>
+                <a:off x="4356436" y="3172255"/>
                 <a:ext cx="4266632" cy="618747"/>
               </a:xfrm>
               <a:prstGeom prst="rect">
@@ -20678,7 +20678,7 @@
             </p:txBody>
           </p:sp>
         </mc:Choice>
-        <mc:Fallback xmlns="">
+        <mc:Fallback>
           <p:sp>
             <p:nvSpPr>
               <p:cNvPr id="29" name="Google Shape;125;p17">
@@ -20695,7 +20695,7 @@
             </p:nvSpPr>
             <p:spPr>
               <a:xfrm>
-                <a:off x="4356436" y="3201676"/>
+                <a:off x="4356436" y="3172255"/>
                 <a:ext cx="4266632" cy="618747"/>
               </a:xfrm>
               <a:prstGeom prst="rect">
@@ -21859,8 +21859,8 @@
           </p:sp>
         </mc:Fallback>
       </mc:AlternateContent>
-      <mc:AlternateContent xmlns:mc="http://schemas.openxmlformats.org/markup-compatibility/2006">
-        <mc:Choice xmlns:a14="http://schemas.microsoft.com/office/drawing/2010/main" Requires="a14">
+      <mc:AlternateContent xmlns:mc="http://schemas.openxmlformats.org/markup-compatibility/2006" xmlns:a14="http://schemas.microsoft.com/office/drawing/2010/main">
+        <mc:Choice Requires="a14">
           <p:sp>
             <p:nvSpPr>
               <p:cNvPr id="22" name="Google Shape;125;p17">
@@ -22192,7 +22192,7 @@
             </p:txBody>
           </p:sp>
         </mc:Choice>
-        <mc:Fallback>
+        <mc:Fallback xmlns="">
           <p:sp>
             <p:nvSpPr>
               <p:cNvPr id="22" name="Google Shape;125;p17">
@@ -22240,8 +22240,8 @@
           </p:sp>
         </mc:Fallback>
       </mc:AlternateContent>
-      <mc:AlternateContent xmlns:mc="http://schemas.openxmlformats.org/markup-compatibility/2006">
-        <mc:Choice xmlns:a14="http://schemas.microsoft.com/office/drawing/2010/main" Requires="a14">
+      <mc:AlternateContent xmlns:mc="http://schemas.openxmlformats.org/markup-compatibility/2006" xmlns:a14="http://schemas.microsoft.com/office/drawing/2010/main">
+        <mc:Choice Requires="a14">
           <p:sp>
             <p:nvSpPr>
               <p:cNvPr id="25" name="TextBox 24">
@@ -22436,7 +22436,7 @@
             </p:txBody>
           </p:sp>
         </mc:Choice>
-        <mc:Fallback>
+        <mc:Fallback xmlns="">
           <p:sp>
             <p:nvSpPr>
               <p:cNvPr id="25" name="TextBox 24">
@@ -22481,8 +22481,8 @@
           </p:sp>
         </mc:Fallback>
       </mc:AlternateContent>
-      <mc:AlternateContent xmlns:mc="http://schemas.openxmlformats.org/markup-compatibility/2006">
-        <mc:Choice xmlns:a14="http://schemas.microsoft.com/office/drawing/2010/main" Requires="a14">
+      <mc:AlternateContent xmlns:mc="http://schemas.openxmlformats.org/markup-compatibility/2006" xmlns:a14="http://schemas.microsoft.com/office/drawing/2010/main">
+        <mc:Choice Requires="a14">
           <p:sp>
             <p:nvSpPr>
               <p:cNvPr id="28" name="Google Shape;125;p17">
@@ -22948,7 +22948,7 @@
             </p:txBody>
           </p:sp>
         </mc:Choice>
-        <mc:Fallback>
+        <mc:Fallback xmlns="">
           <p:sp>
             <p:nvSpPr>
               <p:cNvPr id="28" name="Google Shape;125;p17">
@@ -26097,8 +26097,8 @@
           </a:p>
         </p:txBody>
       </p:sp>
-      <mc:AlternateContent xmlns:mc="http://schemas.openxmlformats.org/markup-compatibility/2006">
-        <mc:Choice xmlns:a14="http://schemas.microsoft.com/office/drawing/2010/main" Requires="a14">
+      <mc:AlternateContent xmlns:mc="http://schemas.openxmlformats.org/markup-compatibility/2006" xmlns:a14="http://schemas.microsoft.com/office/drawing/2010/main">
+        <mc:Choice Requires="a14">
           <p:sp>
             <p:nvSpPr>
               <p:cNvPr id="14" name="TextBox 13">
@@ -26325,7 +26325,7 @@
             </p:txBody>
           </p:sp>
         </mc:Choice>
-        <mc:Fallback>
+        <mc:Fallback xmlns="">
           <p:sp>
             <p:nvSpPr>
               <p:cNvPr id="14" name="TextBox 13">
@@ -27739,8 +27739,8 @@
           </a:p>
         </p:txBody>
       </p:sp>
-      <mc:AlternateContent xmlns:mc="http://schemas.openxmlformats.org/markup-compatibility/2006">
-        <mc:Choice xmlns:a14="http://schemas.microsoft.com/office/drawing/2010/main" Requires="a14">
+      <mc:AlternateContent xmlns:mc="http://schemas.openxmlformats.org/markup-compatibility/2006" xmlns:a14="http://schemas.microsoft.com/office/drawing/2010/main">
+        <mc:Choice Requires="a14">
           <p:sp>
             <p:nvSpPr>
               <p:cNvPr id="9" name="TextBox 8">
@@ -28122,7 +28122,7 @@
             </p:txBody>
           </p:sp>
         </mc:Choice>
-        <mc:Fallback>
+        <mc:Fallback xmlns="">
           <p:sp>
             <p:nvSpPr>
               <p:cNvPr id="9" name="TextBox 8">
@@ -28197,8 +28197,8 @@
           </a:prstGeom>
         </p:spPr>
       </p:pic>
-      <mc:AlternateContent xmlns:mc="http://schemas.openxmlformats.org/markup-compatibility/2006">
-        <mc:Choice xmlns:a14="http://schemas.microsoft.com/office/drawing/2010/main" Requires="a14">
+      <mc:AlternateContent xmlns:mc="http://schemas.openxmlformats.org/markup-compatibility/2006" xmlns:a14="http://schemas.microsoft.com/office/drawing/2010/main">
+        <mc:Choice Requires="a14">
           <p:sp>
             <p:nvSpPr>
               <p:cNvPr id="13" name="TextBox 12">
@@ -28951,7 +28951,7 @@
             </p:txBody>
           </p:sp>
         </mc:Choice>
-        <mc:Fallback>
+        <mc:Fallback xmlns="">
           <p:sp>
             <p:nvSpPr>
               <p:cNvPr id="13" name="TextBox 12">
@@ -29922,8 +29922,8 @@
           </a:effectLst>
         </p:spPr>
       </p:pic>
-      <mc:AlternateContent xmlns:mc="http://schemas.openxmlformats.org/markup-compatibility/2006">
-        <mc:Choice xmlns:a14="http://schemas.microsoft.com/office/drawing/2010/main" Requires="a14">
+      <mc:AlternateContent xmlns:mc="http://schemas.openxmlformats.org/markup-compatibility/2006" xmlns:a14="http://schemas.microsoft.com/office/drawing/2010/main">
+        <mc:Choice Requires="a14">
           <p:sp>
             <p:nvSpPr>
               <p:cNvPr id="16" name="TextBox 15">
@@ -30095,7 +30095,7 @@
             </p:txBody>
           </p:sp>
         </mc:Choice>
-        <mc:Fallback>
+        <mc:Fallback xmlns="">
           <p:sp>
             <p:nvSpPr>
               <p:cNvPr id="16" name="TextBox 15">
@@ -30140,8 +30140,8 @@
           </p:sp>
         </mc:Fallback>
       </mc:AlternateContent>
-      <mc:AlternateContent xmlns:mc="http://schemas.openxmlformats.org/markup-compatibility/2006">
-        <mc:Choice xmlns:a14="http://schemas.microsoft.com/office/drawing/2010/main" Requires="a14">
+      <mc:AlternateContent xmlns:mc="http://schemas.openxmlformats.org/markup-compatibility/2006" xmlns:a14="http://schemas.microsoft.com/office/drawing/2010/main">
+        <mc:Choice Requires="a14">
           <p:sp>
             <p:nvSpPr>
               <p:cNvPr id="17" name="TextBox 16">
@@ -30259,7 +30259,7 @@
             </p:txBody>
           </p:sp>
         </mc:Choice>
-        <mc:Fallback>
+        <mc:Fallback xmlns="">
           <p:sp>
             <p:nvSpPr>
               <p:cNvPr id="17" name="TextBox 16">
@@ -30304,8 +30304,8 @@
           </p:sp>
         </mc:Fallback>
       </mc:AlternateContent>
-      <mc:AlternateContent xmlns:mc="http://schemas.openxmlformats.org/markup-compatibility/2006">
-        <mc:Choice xmlns:a14="http://schemas.microsoft.com/office/drawing/2010/main" Requires="a14">
+      <mc:AlternateContent xmlns:mc="http://schemas.openxmlformats.org/markup-compatibility/2006" xmlns:a14="http://schemas.microsoft.com/office/drawing/2010/main">
+        <mc:Choice Requires="a14">
           <p:sp>
             <p:nvSpPr>
               <p:cNvPr id="19" name="TextBox 18">
@@ -30423,7 +30423,7 @@
             </p:txBody>
           </p:sp>
         </mc:Choice>
-        <mc:Fallback>
+        <mc:Fallback xmlns="">
           <p:sp>
             <p:nvSpPr>
               <p:cNvPr id="19" name="TextBox 18">
@@ -30468,8 +30468,8 @@
           </p:sp>
         </mc:Fallback>
       </mc:AlternateContent>
-      <mc:AlternateContent xmlns:mc="http://schemas.openxmlformats.org/markup-compatibility/2006">
-        <mc:Choice xmlns:a14="http://schemas.microsoft.com/office/drawing/2010/main" Requires="a14">
+      <mc:AlternateContent xmlns:mc="http://schemas.openxmlformats.org/markup-compatibility/2006" xmlns:a14="http://schemas.microsoft.com/office/drawing/2010/main">
+        <mc:Choice Requires="a14">
           <p:sp>
             <p:nvSpPr>
               <p:cNvPr id="21" name="TextBox 20">
@@ -30587,7 +30587,7 @@
             </p:txBody>
           </p:sp>
         </mc:Choice>
-        <mc:Fallback>
+        <mc:Fallback xmlns="">
           <p:sp>
             <p:nvSpPr>
               <p:cNvPr id="21" name="TextBox 20">
@@ -30632,8 +30632,8 @@
           </p:sp>
         </mc:Fallback>
       </mc:AlternateContent>
-      <mc:AlternateContent xmlns:mc="http://schemas.openxmlformats.org/markup-compatibility/2006">
-        <mc:Choice xmlns:a14="http://schemas.microsoft.com/office/drawing/2010/main" Requires="a14">
+      <mc:AlternateContent xmlns:mc="http://schemas.openxmlformats.org/markup-compatibility/2006" xmlns:a14="http://schemas.microsoft.com/office/drawing/2010/main">
+        <mc:Choice Requires="a14">
           <p:sp>
             <p:nvSpPr>
               <p:cNvPr id="23" name="TextBox 22">
@@ -30921,7 +30921,7 @@
             </p:txBody>
           </p:sp>
         </mc:Choice>
-        <mc:Fallback>
+        <mc:Fallback xmlns="">
           <p:sp>
             <p:nvSpPr>
               <p:cNvPr id="23" name="TextBox 22">
@@ -30966,8 +30966,8 @@
           </p:sp>
         </mc:Fallback>
       </mc:AlternateContent>
-      <mc:AlternateContent xmlns:mc="http://schemas.openxmlformats.org/markup-compatibility/2006">
-        <mc:Choice xmlns:a14="http://schemas.microsoft.com/office/drawing/2010/main" Requires="a14">
+      <mc:AlternateContent xmlns:mc="http://schemas.openxmlformats.org/markup-compatibility/2006" xmlns:a14="http://schemas.microsoft.com/office/drawing/2010/main">
+        <mc:Choice Requires="a14">
           <p:sp>
             <p:nvSpPr>
               <p:cNvPr id="25" name="TextBox 24">
@@ -31155,7 +31155,7 @@
             </p:txBody>
           </p:sp>
         </mc:Choice>
-        <mc:Fallback>
+        <mc:Fallback xmlns="">
           <p:sp>
             <p:nvSpPr>
               <p:cNvPr id="25" name="TextBox 24">

</xml_diff>